<commit_message>
UA Lecture 2 and examples
</commit_message>
<xml_diff>
--- a/UA Tutorials/UAClusterIb2dIBAMR.pptx
+++ b/UA Tutorials/UAClusterIb2dIBAMR.pptx
@@ -9784,19 +9784,7 @@
             </a:r>
             <a:r>
               <a:rPr lang="en-US" dirty="0" smtClean="0"/>
-              <a:t>with examples </a:t>
-            </a:r>
-            <a:r>
-              <a:rPr lang="en-US" dirty="0" smtClean="0"/>
-              <a:t>from</a:t>
-            </a:r>
-            <a:r>
-              <a:rPr lang="en-US" dirty="0" smtClean="0"/>
-              <a:t> </a:t>
-            </a:r>
-            <a:r>
-              <a:rPr lang="en-US" dirty="0" smtClean="0"/>
-              <a:t>UNC</a:t>
+              <a:t>with examples from UNC</a:t>
             </a:r>
             <a:endParaRPr lang="en-US" dirty="0"/>
           </a:p>
@@ -10960,7 +10948,7 @@
                 <a:hlinkClick r:id="rId3">
                   <a:extLst>
                     <a:ext uri="{A12FA001-AC4F-418D-AE19-62706E023703}">
-                      <ahyp:hlinkClr xmlns:ahyp="http://schemas.microsoft.com/office/drawing/2018/hyperlinkcolor" xmlns:p15="http://schemas.microsoft.com/office/powerpoint/2012/main" xmlns:p14="http://schemas.microsoft.com/office/powerpoint/2010/main" xmlns:com="http://schemas.openxmlformats.org/drawingml/2006/compatibility" xmlns:pvml="urn:schemas-microsoft-com:office:powerpoint" xmlns:v="urn:schemas-microsoft-com:vml" xmlns:o="urn:schemas-microsoft-com:office:office" xmlns:dgm="http://schemas.openxmlformats.org/drawingml/2006/diagram" xmlns:c="http://schemas.openxmlformats.org/drawingml/2006/chart" xmlns:mv="urn:schemas-microsoft-com:mac:vml" xmlns:mc="http://schemas.openxmlformats.org/markup-compatibility/2006" xmlns="" val="tx"/>
+                      <ahyp:hlinkClr xmlns="" xmlns:mc="http://schemas.openxmlformats.org/markup-compatibility/2006" xmlns:mv="urn:schemas-microsoft-com:mac:vml" xmlns:c="http://schemas.openxmlformats.org/drawingml/2006/chart" xmlns:dgm="http://schemas.openxmlformats.org/drawingml/2006/diagram" xmlns:o="urn:schemas-microsoft-com:office:office" xmlns:v="urn:schemas-microsoft-com:vml" xmlns:pvml="urn:schemas-microsoft-com:office:powerpoint" xmlns:com="http://schemas.openxmlformats.org/drawingml/2006/compatibility" xmlns:p14="http://schemas.microsoft.com/office/powerpoint/2010/main" xmlns:p15="http://schemas.microsoft.com/office/powerpoint/2012/main" xmlns:ahyp="http://schemas.microsoft.com/office/drawing/2018/hyperlinkcolor" val="tx"/>
                     </a:ext>
                   </a:extLst>
                 </a:hlinkClick>
@@ -10975,7 +10963,7 @@
                 <a:hlinkClick r:id="rId3">
                   <a:extLst>
                     <a:ext uri="{A12FA001-AC4F-418D-AE19-62706E023703}">
-                      <ahyp:hlinkClr xmlns:ahyp="http://schemas.microsoft.com/office/drawing/2018/hyperlinkcolor" xmlns:p15="http://schemas.microsoft.com/office/powerpoint/2012/main" xmlns:p14="http://schemas.microsoft.com/office/powerpoint/2010/main" xmlns:com="http://schemas.openxmlformats.org/drawingml/2006/compatibility" xmlns:pvml="urn:schemas-microsoft-com:office:powerpoint" xmlns:v="urn:schemas-microsoft-com:vml" xmlns:o="urn:schemas-microsoft-com:office:office" xmlns:dgm="http://schemas.openxmlformats.org/drawingml/2006/diagram" xmlns:c="http://schemas.openxmlformats.org/drawingml/2006/chart" xmlns:mv="urn:schemas-microsoft-com:mac:vml" xmlns:mc="http://schemas.openxmlformats.org/markup-compatibility/2006" xmlns="" val="tx"/>
+                      <ahyp:hlinkClr xmlns="" xmlns:mc="http://schemas.openxmlformats.org/markup-compatibility/2006" xmlns:mv="urn:schemas-microsoft-com:mac:vml" xmlns:c="http://schemas.openxmlformats.org/drawingml/2006/chart" xmlns:dgm="http://schemas.openxmlformats.org/drawingml/2006/diagram" xmlns:o="urn:schemas-microsoft-com:office:office" xmlns:v="urn:schemas-microsoft-com:vml" xmlns:pvml="urn:schemas-microsoft-com:office:powerpoint" xmlns:com="http://schemas.openxmlformats.org/drawingml/2006/compatibility" xmlns:p14="http://schemas.microsoft.com/office/powerpoint/2010/main" xmlns:p15="http://schemas.microsoft.com/office/powerpoint/2012/main" xmlns:ahyp="http://schemas.microsoft.com/office/drawing/2018/hyperlinkcolor" val="tx"/>
                     </a:ext>
                   </a:extLst>
                 </a:hlinkClick>
@@ -11195,7 +11183,7 @@
                 <a:hlinkClick r:id="rId3">
                   <a:extLst>
                     <a:ext uri="{A12FA001-AC4F-418D-AE19-62706E023703}">
-                      <ahyp:hlinkClr xmlns:ahyp="http://schemas.microsoft.com/office/drawing/2018/hyperlinkcolor" xmlns:p15="http://schemas.microsoft.com/office/powerpoint/2012/main" xmlns:p14="http://schemas.microsoft.com/office/powerpoint/2010/main" xmlns:com="http://schemas.openxmlformats.org/drawingml/2006/compatibility" xmlns:pvml="urn:schemas-microsoft-com:office:powerpoint" xmlns:v="urn:schemas-microsoft-com:vml" xmlns:o="urn:schemas-microsoft-com:office:office" xmlns:dgm="http://schemas.openxmlformats.org/drawingml/2006/diagram" xmlns:c="http://schemas.openxmlformats.org/drawingml/2006/chart" xmlns:mv="urn:schemas-microsoft-com:mac:vml" xmlns:mc="http://schemas.openxmlformats.org/markup-compatibility/2006" xmlns="" val="tx"/>
+                      <ahyp:hlinkClr xmlns="" xmlns:mc="http://schemas.openxmlformats.org/markup-compatibility/2006" xmlns:mv="urn:schemas-microsoft-com:mac:vml" xmlns:c="http://schemas.openxmlformats.org/drawingml/2006/chart" xmlns:dgm="http://schemas.openxmlformats.org/drawingml/2006/diagram" xmlns:o="urn:schemas-microsoft-com:office:office" xmlns:v="urn:schemas-microsoft-com:vml" xmlns:pvml="urn:schemas-microsoft-com:office:powerpoint" xmlns:com="http://schemas.openxmlformats.org/drawingml/2006/compatibility" xmlns:p14="http://schemas.microsoft.com/office/powerpoint/2010/main" xmlns:p15="http://schemas.microsoft.com/office/powerpoint/2012/main" xmlns:ahyp="http://schemas.microsoft.com/office/drawing/2018/hyperlinkcolor" val="tx"/>
                     </a:ext>
                   </a:extLst>
                 </a:hlinkClick>
@@ -11339,7 +11327,7 @@
                 <a:hlinkClick r:id="rId4">
                   <a:extLst>
                     <a:ext uri="{A12FA001-AC4F-418D-AE19-62706E023703}">
-                      <ahyp:hlinkClr xmlns:ahyp="http://schemas.microsoft.com/office/drawing/2018/hyperlinkcolor" xmlns:p15="http://schemas.microsoft.com/office/powerpoint/2012/main" xmlns:p14="http://schemas.microsoft.com/office/powerpoint/2010/main" xmlns:com="http://schemas.openxmlformats.org/drawingml/2006/compatibility" xmlns:pvml="urn:schemas-microsoft-com:office:powerpoint" xmlns:v="urn:schemas-microsoft-com:vml" xmlns:o="urn:schemas-microsoft-com:office:office" xmlns:dgm="http://schemas.openxmlformats.org/drawingml/2006/diagram" xmlns:c="http://schemas.openxmlformats.org/drawingml/2006/chart" xmlns:mv="urn:schemas-microsoft-com:mac:vml" xmlns:mc="http://schemas.openxmlformats.org/markup-compatibility/2006" xmlns="" val="tx"/>
+                      <ahyp:hlinkClr xmlns="" xmlns:mc="http://schemas.openxmlformats.org/markup-compatibility/2006" xmlns:mv="urn:schemas-microsoft-com:mac:vml" xmlns:c="http://schemas.openxmlformats.org/drawingml/2006/chart" xmlns:dgm="http://schemas.openxmlformats.org/drawingml/2006/diagram" xmlns:o="urn:schemas-microsoft-com:office:office" xmlns:v="urn:schemas-microsoft-com:vml" xmlns:pvml="urn:schemas-microsoft-com:office:powerpoint" xmlns:com="http://schemas.openxmlformats.org/drawingml/2006/compatibility" xmlns:p14="http://schemas.microsoft.com/office/powerpoint/2010/main" xmlns:p15="http://schemas.microsoft.com/office/powerpoint/2012/main" xmlns:ahyp="http://schemas.microsoft.com/office/drawing/2018/hyperlinkcolor" val="tx"/>
                     </a:ext>
                   </a:extLst>
                 </a:hlinkClick>
@@ -11542,6 +11530,47 @@
             </a:endParaRPr>
           </a:p>
           <a:p>
+            <a:pPr marL="0" indent="0">
+              <a:spcBef>
+                <a:spcPts val="1200"/>
+              </a:spcBef>
+              <a:spcAft>
+                <a:spcPts val="1200"/>
+              </a:spcAft>
+              <a:buNone/>
+            </a:pPr>
+            <a:r>
+              <a:rPr lang="en" dirty="0">
+                <a:solidFill>
+                  <a:schemeClr val="dk1"/>
+                </a:solidFill>
+              </a:rPr>
+              <a:t>To log into the web interface, go </a:t>
+            </a:r>
+            <a:r>
+              <a:rPr lang="en" dirty="0" smtClean="0">
+                <a:solidFill>
+                  <a:schemeClr val="dk1"/>
+                </a:solidFill>
+              </a:rPr>
+              <a:t>to </a:t>
+            </a:r>
+            <a:r>
+              <a:rPr lang="en-US" u="sng" dirty="0">
+                <a:solidFill>
+                  <a:schemeClr val="accent5"/>
+                </a:solidFill>
+                <a:hlinkClick r:id="rId3"/>
+              </a:rPr>
+              <a:t>https://OnDemand.hpc.arizona.edu</a:t>
+            </a:r>
+            <a:endParaRPr lang="en-US" dirty="0">
+              <a:solidFill>
+                <a:schemeClr val="accent5"/>
+              </a:solidFill>
+            </a:endParaRPr>
+          </a:p>
+          <a:p>
             <a:pPr marL="0" lvl="0" indent="0" algn="l" rtl="0">
               <a:spcBef>
                 <a:spcPts val="1200"/>
@@ -11551,23 +11580,6 @@
               </a:spcAft>
               <a:buNone/>
             </a:pPr>
-            <a:r>
-              <a:rPr lang="en" dirty="0">
-                <a:solidFill>
-                  <a:schemeClr val="dk1"/>
-                </a:solidFill>
-              </a:rPr>
-              <a:t>To log into the web interface, go to </a:t>
-            </a:r>
-            <a:r>
-              <a:rPr lang="en" u="sng" dirty="0">
-                <a:solidFill>
-                  <a:schemeClr val="accent5"/>
-                </a:solidFill>
-                <a:hlinkClick r:id="rId3"/>
-              </a:rPr>
-              <a:t>https://OnDemand.hpc.arizona.edu</a:t>
-            </a:r>
             <a:endParaRPr dirty="0">
               <a:solidFill>
                 <a:schemeClr val="accent5"/>
@@ -11816,7 +11828,7 @@
                 <a:hlinkClick r:id="rId3">
                   <a:extLst>
                     <a:ext uri="{A12FA001-AC4F-418D-AE19-62706E023703}">
-                      <ahyp:hlinkClr xmlns:ahyp="http://schemas.microsoft.com/office/drawing/2018/hyperlinkcolor" xmlns:p15="http://schemas.microsoft.com/office/powerpoint/2012/main" xmlns:p14="http://schemas.microsoft.com/office/powerpoint/2010/main" xmlns:com="http://schemas.openxmlformats.org/drawingml/2006/compatibility" xmlns:pvml="urn:schemas-microsoft-com:office:powerpoint" xmlns:v="urn:schemas-microsoft-com:vml" xmlns:o="urn:schemas-microsoft-com:office:office" xmlns:dgm="http://schemas.openxmlformats.org/drawingml/2006/diagram" xmlns:c="http://schemas.openxmlformats.org/drawingml/2006/chart" xmlns:mv="urn:schemas-microsoft-com:mac:vml" xmlns:mc="http://schemas.openxmlformats.org/markup-compatibility/2006" xmlns="" val="tx"/>
+                      <ahyp:hlinkClr xmlns="" xmlns:mc="http://schemas.openxmlformats.org/markup-compatibility/2006" xmlns:mv="urn:schemas-microsoft-com:mac:vml" xmlns:c="http://schemas.openxmlformats.org/drawingml/2006/chart" xmlns:dgm="http://schemas.openxmlformats.org/drawingml/2006/diagram" xmlns:o="urn:schemas-microsoft-com:office:office" xmlns:v="urn:schemas-microsoft-com:vml" xmlns:pvml="urn:schemas-microsoft-com:office:powerpoint" xmlns:com="http://schemas.openxmlformats.org/drawingml/2006/compatibility" xmlns:p14="http://schemas.microsoft.com/office/powerpoint/2010/main" xmlns:p15="http://schemas.microsoft.com/office/powerpoint/2012/main" xmlns:ahyp="http://schemas.microsoft.com/office/drawing/2018/hyperlinkcolor" val="tx"/>
                     </a:ext>
                   </a:extLst>
                 </a:hlinkClick>

</xml_diff>

<commit_message>
fixed rubber band AZ example
</commit_message>
<xml_diff>
--- a/UA Tutorials/UAClusterIb2dIBAMR.pptx
+++ b/UA Tutorials/UAClusterIb2dIBAMR.pptx
@@ -5,7 +5,7 @@
     <p:sldMasterId id="2147483659" r:id="rId1"/>
   </p:sldMasterIdLst>
   <p:notesMasterIdLst>
-    <p:notesMasterId r:id="rId27"/>
+    <p:notesMasterId r:id="rId28"/>
   </p:notesMasterIdLst>
   <p:sldIdLst>
     <p:sldId id="256" r:id="rId2"/>
@@ -31,18 +31,19 @@
     <p:sldId id="278" r:id="rId22"/>
     <p:sldId id="275" r:id="rId23"/>
     <p:sldId id="276" r:id="rId24"/>
-    <p:sldId id="284" r:id="rId25"/>
-    <p:sldId id="277" r:id="rId26"/>
+    <p:sldId id="288" r:id="rId25"/>
+    <p:sldId id="284" r:id="rId26"/>
+    <p:sldId id="277" r:id="rId27"/>
   </p:sldIdLst>
   <p:sldSz cx="9144000" cy="5143500" type="screen16x9"/>
   <p:notesSz cx="6858000" cy="9144000"/>
   <p:embeddedFontLst>
     <p:embeddedFont>
       <p:font typeface="Roboto Mono" panose="020B0604020202020204" charset="0"/>
-      <p:regular r:id="rId28"/>
-      <p:bold r:id="rId29"/>
-      <p:italic r:id="rId30"/>
-      <p:boldItalic r:id="rId31"/>
+      <p:regular r:id="rId29"/>
+      <p:bold r:id="rId30"/>
+      <p:italic r:id="rId31"/>
+      <p:boldItalic r:id="rId32"/>
     </p:embeddedFont>
   </p:embeddedFontLst>
   <p:defaultTextStyle>
@@ -10294,149 +10295,49 @@
             <a:pPr fontAlgn="base"/>
             <a:r>
               <a:rPr lang="en-US" dirty="0"/>
-              <a:t>There is a small change needed in the main file for IBFE examples.</a:t>
+              <a:t>The new installation where IBFE works is as follows:</a:t>
+            </a:r>
+          </a:p>
+          <a:p>
+            <a:pPr lvl="1"/>
+            <a:r>
+              <a:rPr lang="en-US" dirty="0"/>
+              <a:t>IBAMR_SRC_DIR = </a:t>
+            </a:r>
+          </a:p>
+          <a:p>
+            <a:pPr lvl="1"/>
+            <a:r>
+              <a:rPr lang="en-US" dirty="0"/>
+              <a:t>IBAMR_BUILD_DIR = </a:t>
+            </a:r>
+          </a:p>
+          <a:p>
+            <a:pPr lvl="1"/>
+            <a:r>
+              <a:rPr lang="en-US" dirty="0"/>
+              <a:t>LIBSNEW = $(LIBS) -</a:t>
+            </a:r>
+            <a:r>
+              <a:rPr lang="en-US" dirty="0" err="1"/>
+              <a:t>lnetcdf</a:t>
+            </a:r>
+            <a:r>
+              <a:rPr lang="en-US" dirty="0"/>
+              <a:t> -</a:t>
+            </a:r>
+            <a:r>
+              <a:rPr lang="en-US" dirty="0" err="1"/>
+              <a:t>lcurl</a:t>
+            </a:r>
+            <a:r>
+              <a:rPr lang="en-US" dirty="0"/>
+              <a:t> </a:t>
             </a:r>
           </a:p>
           <a:p>
             <a:pPr lvl="1" fontAlgn="base"/>
-            <a:r>
-              <a:rPr lang="en-US" dirty="0"/>
-              <a:t>Comment out the </a:t>
-            </a:r>
-            <a:r>
-              <a:rPr lang="en-US" dirty="0" err="1"/>
-              <a:t>AutoPtr</a:t>
-            </a:r>
-            <a:r>
-              <a:rPr lang="en-US" dirty="0"/>
-              <a:t> below and replace with </a:t>
-            </a:r>
-            <a:r>
-              <a:rPr lang="en-US" dirty="0" err="1"/>
-              <a:t>std</a:t>
-            </a:r>
-            <a:r>
-              <a:rPr lang="en-US" dirty="0"/>
-              <a:t>::</a:t>
-            </a:r>
-            <a:r>
-              <a:rPr lang="en-US" dirty="0" err="1"/>
-              <a:t>unique_ptr</a:t>
-            </a:r>
             <a:endParaRPr lang="en-US" dirty="0"/>
-          </a:p>
-          <a:p>
-            <a:pPr marL="596900" lvl="1" indent="0">
-              <a:buNone/>
-            </a:pPr>
-            <a:r>
-              <a:rPr lang="en-US" dirty="0"/>
-              <a:t>	//</a:t>
-            </a:r>
-            <a:r>
-              <a:rPr lang="en-US" dirty="0" err="1"/>
-              <a:t>AutoPtr</a:t>
-            </a:r>
-            <a:r>
-              <a:rPr lang="en-US" dirty="0"/>
-              <a:t>&lt;</a:t>
-            </a:r>
-            <a:r>
-              <a:rPr lang="en-US" dirty="0" err="1"/>
-              <a:t>ExodusII_IO</a:t>
-            </a:r>
-            <a:r>
-              <a:rPr lang="en-US" dirty="0"/>
-              <a:t>&gt; </a:t>
-            </a:r>
-            <a:r>
-              <a:rPr lang="en-US" dirty="0" err="1"/>
-              <a:t>exodus_io</a:t>
-            </a:r>
-            <a:r>
-              <a:rPr lang="en-US" dirty="0"/>
-              <a:t>(</a:t>
-            </a:r>
-            <a:r>
-              <a:rPr lang="en-US" dirty="0" err="1"/>
-              <a:t>uses_exodus</a:t>
-            </a:r>
-            <a:r>
-              <a:rPr lang="en-US" dirty="0"/>
-              <a:t> ? new </a:t>
-            </a:r>
-            <a:r>
-              <a:rPr lang="en-US" dirty="0" err="1"/>
-              <a:t>ExodusII_IO</a:t>
-            </a:r>
-            <a:r>
-              <a:rPr lang="en-US" dirty="0"/>
-              <a:t>(mesh) : NULL);</a:t>
-            </a:r>
-          </a:p>
-          <a:p>
-            <a:pPr marL="596900" lvl="1" indent="0">
-              <a:buNone/>
-            </a:pPr>
-            <a:r>
-              <a:rPr lang="en-US" dirty="0"/>
-              <a:t>	</a:t>
-            </a:r>
-            <a:r>
-              <a:rPr lang="en-US" dirty="0" err="1"/>
-              <a:t>std</a:t>
-            </a:r>
-            <a:r>
-              <a:rPr lang="en-US" dirty="0"/>
-              <a:t>::</a:t>
-            </a:r>
-            <a:r>
-              <a:rPr lang="en-US" dirty="0" err="1"/>
-              <a:t>unique_ptr</a:t>
-            </a:r>
-            <a:r>
-              <a:rPr lang="en-US" dirty="0"/>
-              <a:t>&lt;</a:t>
-            </a:r>
-            <a:r>
-              <a:rPr lang="en-US" dirty="0" err="1"/>
-              <a:t>ExodusII_IO</a:t>
-            </a:r>
-            <a:r>
-              <a:rPr lang="en-US" dirty="0"/>
-              <a:t>&gt; </a:t>
-            </a:r>
-            <a:r>
-              <a:rPr lang="en-US" dirty="0" err="1"/>
-              <a:t>exodus_io</a:t>
-            </a:r>
-            <a:r>
-              <a:rPr lang="en-US" dirty="0"/>
-              <a:t>(</a:t>
-            </a:r>
-            <a:r>
-              <a:rPr lang="en-US" dirty="0" err="1"/>
-              <a:t>uses_exodus</a:t>
-            </a:r>
-            <a:r>
-              <a:rPr lang="en-US" dirty="0"/>
-              <a:t> ? new </a:t>
-            </a:r>
-            <a:r>
-              <a:rPr lang="en-US" dirty="0" err="1"/>
-              <a:t>ExodusII_IO</a:t>
-            </a:r>
-            <a:r>
-              <a:rPr lang="en-US" dirty="0"/>
-              <a:t>(mesh) : NULL);</a:t>
-            </a:r>
-          </a:p>
-          <a:p>
-            <a:pPr fontAlgn="base"/>
-            <a:r>
-              <a:rPr lang="en-US" dirty="0"/>
-              <a:t>There may be other changes needed, but this is the only one I’ve encountered so far.</a:t>
-            </a:r>
           </a:p>
           <a:p>
             <a:endParaRPr lang="en-US" dirty="0"/>
@@ -10457,6 +10358,220 @@
 </file>
 
 <file path=ppt/slides/slide24.xml><?xml version="1.0" encoding="utf-8"?>
+<p:sld xmlns:a="http://schemas.openxmlformats.org/drawingml/2006/main" xmlns:r="http://schemas.openxmlformats.org/officeDocument/2006/relationships" xmlns:p="http://schemas.openxmlformats.org/presentationml/2006/main">
+  <p:cSld>
+    <p:spTree>
+      <p:nvGrpSpPr>
+        <p:cNvPr id="1" name=""/>
+        <p:cNvGrpSpPr/>
+        <p:nvPr/>
+      </p:nvGrpSpPr>
+      <p:grpSpPr>
+        <a:xfrm>
+          <a:off x="0" y="0"/>
+          <a:ext cx="0" cy="0"/>
+          <a:chOff x="0" y="0"/>
+          <a:chExt cx="0" cy="0"/>
+        </a:xfrm>
+      </p:grpSpPr>
+      <p:sp>
+        <p:nvSpPr>
+          <p:cNvPr id="2" name="Title 1">
+            <a:extLst>
+              <a:ext uri="{FF2B5EF4-FFF2-40B4-BE49-F238E27FC236}">
+                <a16:creationId xmlns:a16="http://schemas.microsoft.com/office/drawing/2014/main" id="{D8135800-1A8D-5532-20C6-37BC944E9273}"/>
+              </a:ext>
+            </a:extLst>
+          </p:cNvPr>
+          <p:cNvSpPr>
+            <a:spLocks noGrp="1"/>
+          </p:cNvSpPr>
+          <p:nvPr>
+            <p:ph type="title"/>
+          </p:nvPr>
+        </p:nvSpPr>
+        <p:spPr/>
+        <p:txBody>
+          <a:bodyPr>
+            <a:normAutofit fontScale="90000"/>
+          </a:bodyPr>
+          <a:lstStyle/>
+          <a:p>
+            <a:r>
+              <a:rPr lang="en-US" dirty="0"/>
+              <a:t>Updating examples from UNC</a:t>
+            </a:r>
+          </a:p>
+        </p:txBody>
+      </p:sp>
+      <p:sp>
+        <p:nvSpPr>
+          <p:cNvPr id="3" name="Text Placeholder 2">
+            <a:extLst>
+              <a:ext uri="{FF2B5EF4-FFF2-40B4-BE49-F238E27FC236}">
+                <a16:creationId xmlns:a16="http://schemas.microsoft.com/office/drawing/2014/main" id="{43BEC97C-6F3B-D5F1-4087-59E5D63B07BE}"/>
+              </a:ext>
+            </a:extLst>
+          </p:cNvPr>
+          <p:cNvSpPr>
+            <a:spLocks noGrp="1"/>
+          </p:cNvSpPr>
+          <p:nvPr>
+            <p:ph type="body" idx="1"/>
+          </p:nvPr>
+        </p:nvSpPr>
+        <p:spPr/>
+        <p:txBody>
+          <a:bodyPr/>
+          <a:lstStyle/>
+          <a:p>
+            <a:pPr fontAlgn="base"/>
+            <a:r>
+              <a:rPr lang="en-US" dirty="0"/>
+              <a:t>There is a small change needed in the main file for IBFE examples.</a:t>
+            </a:r>
+          </a:p>
+          <a:p>
+            <a:pPr lvl="1" fontAlgn="base"/>
+            <a:r>
+              <a:rPr lang="en-US" dirty="0"/>
+              <a:t>Comment out the </a:t>
+            </a:r>
+            <a:r>
+              <a:rPr lang="en-US" dirty="0" err="1"/>
+              <a:t>AutoPtr</a:t>
+            </a:r>
+            <a:r>
+              <a:rPr lang="en-US" dirty="0"/>
+              <a:t> below and replace with std::</a:t>
+            </a:r>
+            <a:r>
+              <a:rPr lang="en-US" dirty="0" err="1"/>
+              <a:t>unique_ptr</a:t>
+            </a:r>
+            <a:endParaRPr lang="en-US" dirty="0"/>
+          </a:p>
+          <a:p>
+            <a:pPr marL="596900" lvl="1" indent="0">
+              <a:buNone/>
+            </a:pPr>
+            <a:r>
+              <a:rPr lang="en-US" dirty="0"/>
+              <a:t>	//</a:t>
+            </a:r>
+            <a:r>
+              <a:rPr lang="en-US" dirty="0" err="1"/>
+              <a:t>AutoPtr</a:t>
+            </a:r>
+            <a:r>
+              <a:rPr lang="en-US" dirty="0"/>
+              <a:t>&lt;</a:t>
+            </a:r>
+            <a:r>
+              <a:rPr lang="en-US" dirty="0" err="1"/>
+              <a:t>ExodusII_IO</a:t>
+            </a:r>
+            <a:r>
+              <a:rPr lang="en-US" dirty="0"/>
+              <a:t>&gt; </a:t>
+            </a:r>
+            <a:r>
+              <a:rPr lang="en-US" dirty="0" err="1"/>
+              <a:t>exodus_io</a:t>
+            </a:r>
+            <a:r>
+              <a:rPr lang="en-US" dirty="0"/>
+              <a:t>(</a:t>
+            </a:r>
+            <a:r>
+              <a:rPr lang="en-US" dirty="0" err="1"/>
+              <a:t>uses_exodus</a:t>
+            </a:r>
+            <a:r>
+              <a:rPr lang="en-US" dirty="0"/>
+              <a:t> ? new </a:t>
+            </a:r>
+            <a:r>
+              <a:rPr lang="en-US" dirty="0" err="1"/>
+              <a:t>ExodusII_IO</a:t>
+            </a:r>
+            <a:r>
+              <a:rPr lang="en-US" dirty="0"/>
+              <a:t>(mesh) : NULL);</a:t>
+            </a:r>
+          </a:p>
+          <a:p>
+            <a:pPr marL="596900" lvl="1" indent="0">
+              <a:buNone/>
+            </a:pPr>
+            <a:r>
+              <a:rPr lang="en-US" dirty="0"/>
+              <a:t>	std::</a:t>
+            </a:r>
+            <a:r>
+              <a:rPr lang="en-US" dirty="0" err="1"/>
+              <a:t>unique_ptr</a:t>
+            </a:r>
+            <a:r>
+              <a:rPr lang="en-US" dirty="0"/>
+              <a:t>&lt;</a:t>
+            </a:r>
+            <a:r>
+              <a:rPr lang="en-US" dirty="0" err="1"/>
+              <a:t>ExodusII_IO</a:t>
+            </a:r>
+            <a:r>
+              <a:rPr lang="en-US" dirty="0"/>
+              <a:t>&gt; </a:t>
+            </a:r>
+            <a:r>
+              <a:rPr lang="en-US" dirty="0" err="1"/>
+              <a:t>exodus_io</a:t>
+            </a:r>
+            <a:r>
+              <a:rPr lang="en-US" dirty="0"/>
+              <a:t>(</a:t>
+            </a:r>
+            <a:r>
+              <a:rPr lang="en-US" dirty="0" err="1"/>
+              <a:t>uses_exodus</a:t>
+            </a:r>
+            <a:r>
+              <a:rPr lang="en-US" dirty="0"/>
+              <a:t> ? new </a:t>
+            </a:r>
+            <a:r>
+              <a:rPr lang="en-US" dirty="0" err="1"/>
+              <a:t>ExodusII_IO</a:t>
+            </a:r>
+            <a:r>
+              <a:rPr lang="en-US" dirty="0"/>
+              <a:t>(mesh) : NULL);</a:t>
+            </a:r>
+          </a:p>
+          <a:p>
+            <a:pPr fontAlgn="base"/>
+            <a:r>
+              <a:rPr lang="en-US" dirty="0"/>
+              <a:t>There may be other changes needed, but this is the only one I’ve encountered so far</a:t>
+            </a:r>
+          </a:p>
+        </p:txBody>
+      </p:sp>
+    </p:spTree>
+    <p:extLst>
+      <p:ext uri="{BB962C8B-B14F-4D97-AF65-F5344CB8AC3E}">
+        <p14:creationId xmlns:p14="http://schemas.microsoft.com/office/powerpoint/2010/main" val="1363450144"/>
+      </p:ext>
+    </p:extLst>
+  </p:cSld>
+  <p:clrMapOvr>
+    <a:masterClrMapping/>
+  </p:clrMapOvr>
+</p:sld>
+</file>
+
+<file path=ppt/slides/slide25.xml><?xml version="1.0" encoding="utf-8"?>
 <p:sld xmlns:a="http://schemas.openxmlformats.org/drawingml/2006/main" xmlns:r="http://schemas.openxmlformats.org/officeDocument/2006/relationships" xmlns:p="http://schemas.openxmlformats.org/presentationml/2006/main">
   <p:cSld>
     <p:spTree>
@@ -10897,7 +11012,7 @@
 </p:sld>
 </file>
 
-<file path=ppt/slides/slide25.xml><?xml version="1.0" encoding="utf-8"?>
+<file path=ppt/slides/slide26.xml><?xml version="1.0" encoding="utf-8"?>
 <p:sld xmlns:a="http://schemas.openxmlformats.org/drawingml/2006/main" xmlns:r="http://schemas.openxmlformats.org/officeDocument/2006/relationships" xmlns:p="http://schemas.openxmlformats.org/presentationml/2006/main">
   <p:cSld>
     <p:spTree>

</xml_diff>

<commit_message>
new path to IBAMR directory
</commit_message>
<xml_diff>
--- a/UA Tutorials/UAClusterIb2dIBAMR.pptx
+++ b/UA Tutorials/UAClusterIb2dIBAMR.pptx
@@ -10302,14 +10302,46 @@
             <a:pPr lvl="1"/>
             <a:r>
               <a:rPr lang="en-US" dirty="0"/>
-              <a:t>IBAMR_SRC_DIR = </a:t>
+              <a:t>IBAMR_SRC_DIR = /groups/lauram9/ib10/</a:t>
+            </a:r>
+            <a:r>
+              <a:rPr lang="en-US" dirty="0" err="1"/>
+              <a:t>ibamr</a:t>
+            </a:r>
+            <a:r>
+              <a:rPr lang="en-US" dirty="0"/>
+              <a:t>/IBAMR </a:t>
             </a:r>
           </a:p>
           <a:p>
             <a:pPr lvl="1"/>
             <a:r>
               <a:rPr lang="en-US" dirty="0"/>
-              <a:t>IBAMR_BUILD_DIR = </a:t>
+              <a:t>IBAMR_BUILD_DIR = /groups/lauram9/ib10/</a:t>
+            </a:r>
+            <a:r>
+              <a:rPr lang="en-US" dirty="0" err="1"/>
+              <a:t>ibamr</a:t>
+            </a:r>
+            <a:r>
+              <a:rPr lang="en-US" dirty="0"/>
+              <a:t>/</a:t>
+            </a:r>
+            <a:r>
+              <a:rPr lang="en-US" dirty="0" err="1"/>
+              <a:t>ibamr</a:t>
+            </a:r>
+            <a:r>
+              <a:rPr lang="en-US" dirty="0"/>
+              <a:t>-</a:t>
+            </a:r>
+            <a:r>
+              <a:rPr lang="en-US" dirty="0" err="1"/>
+              <a:t>objs</a:t>
+            </a:r>
+            <a:r>
+              <a:rPr lang="en-US" dirty="0"/>
+              <a:t>-opt</a:t>
             </a:r>
           </a:p>
           <a:p>

</xml_diff>